<commit_message>
[V0.5][Documentation] Update activity diagram
</commit_message>
<xml_diff>
--- a/docs/diagrams/ActivityDiagram.pptx
+++ b/docs/diagrams/ActivityDiagram.pptx
@@ -3557,7 +3557,7 @@
         <p:spPr>
           <a:xfrm>
             <a:off x="152400" y="304800"/>
-            <a:ext cx="8077200" cy="6248400"/>
+            <a:ext cx="10744200" cy="6248400"/>
           </a:xfrm>
           <a:prstGeom prst="roundRect">
             <a:avLst>
@@ -3565,27 +3565,22 @@
             </a:avLst>
           </a:prstGeom>
           <a:solidFill>
-            <a:schemeClr val="tx1"/>
+            <a:schemeClr val="tx2">
+              <a:lumMod val="20000"/>
+              <a:lumOff val="80000"/>
+            </a:schemeClr>
           </a:solidFill>
-          <a:ln>
-            <a:solidFill>
-              <a:schemeClr val="bg1">
-                <a:lumMod val="85000"/>
-              </a:schemeClr>
-            </a:solidFill>
-          </a:ln>
+          <a:ln/>
         </p:spPr>
         <p:style>
-          <a:lnRef idx="2">
-            <a:schemeClr val="accent1">
-              <a:shade val="50000"/>
-            </a:schemeClr>
+          <a:lnRef idx="1">
+            <a:schemeClr val="accent3"/>
           </a:lnRef>
-          <a:fillRef idx="1">
-            <a:schemeClr val="accent1"/>
+          <a:fillRef idx="3">
+            <a:schemeClr val="accent3"/>
           </a:fillRef>
-          <a:effectRef idx="0">
-            <a:schemeClr val="accent1"/>
+          <a:effectRef idx="2">
+            <a:schemeClr val="accent3"/>
           </a:effectRef>
           <a:fontRef idx="minor">
             <a:schemeClr val="lt1"/>
@@ -3621,11 +3616,6 @@
             </a:avLst>
           </a:prstGeom>
           <a:ln>
-            <a:solidFill>
-              <a:schemeClr val="bg2">
-                <a:lumMod val="75000"/>
-              </a:schemeClr>
-            </a:solidFill>
             <a:tailEnd type="triangle"/>
           </a:ln>
         </p:spPr>
@@ -3785,28 +3775,22 @@
           <a:prstGeom prst="roundRect">
             <a:avLst/>
           </a:prstGeom>
-          <a:solidFill>
-            <a:schemeClr val="accent3"/>
-          </a:solidFill>
-          <a:ln w="19050">
-            <a:solidFill>
-              <a:schemeClr val="bg1"/>
-            </a:solidFill>
-          </a:ln>
-          <a:effectLst/>
+          <a:ln/>
         </p:spPr>
         <p:style>
-          <a:lnRef idx="1">
-            <a:schemeClr val="accent2"/>
+          <a:lnRef idx="2">
+            <a:schemeClr val="accent5">
+              <a:shade val="50000"/>
+            </a:schemeClr>
           </a:lnRef>
-          <a:fillRef idx="2">
-            <a:schemeClr val="accent2"/>
+          <a:fillRef idx="1">
+            <a:schemeClr val="accent5"/>
           </a:fillRef>
-          <a:effectRef idx="1">
-            <a:schemeClr val="accent2"/>
+          <a:effectRef idx="0">
+            <a:schemeClr val="accent5"/>
           </a:effectRef>
           <a:fontRef idx="minor">
-            <a:schemeClr val="dk1"/>
+            <a:schemeClr val="lt1"/>
           </a:fontRef>
         </p:style>
         <p:txBody>
@@ -3853,18 +3837,10 @@
           <a:p>
             <a:pPr algn="ctr"/>
             <a:r>
-              <a:rPr lang="en-SG" sz="1400" dirty="0" smtClean="0">
-                <a:solidFill>
-                  <a:schemeClr val="bg1"/>
-                </a:solidFill>
-              </a:rPr>
+              <a:rPr lang="en-SG" sz="1400" dirty="0" smtClean="0"/>
               <a:t>(start application)</a:t>
             </a:r>
-            <a:endParaRPr lang="en-SG" sz="1400" dirty="0">
-              <a:solidFill>
-                <a:schemeClr val="bg1"/>
-              </a:solidFill>
-            </a:endParaRPr>
+            <a:endParaRPr lang="en-SG" sz="1400" dirty="0"/>
           </a:p>
         </p:txBody>
       </p:sp>
@@ -3980,28 +3956,22 @@
           <a:prstGeom prst="roundRect">
             <a:avLst/>
           </a:prstGeom>
-          <a:solidFill>
-            <a:schemeClr val="accent3"/>
-          </a:solidFill>
-          <a:ln w="19050">
-            <a:solidFill>
-              <a:schemeClr val="bg1"/>
-            </a:solidFill>
-          </a:ln>
-          <a:effectLst/>
+          <a:ln/>
         </p:spPr>
         <p:style>
-          <a:lnRef idx="1">
-            <a:schemeClr val="accent2"/>
+          <a:lnRef idx="2">
+            <a:schemeClr val="accent5">
+              <a:shade val="50000"/>
+            </a:schemeClr>
           </a:lnRef>
-          <a:fillRef idx="2">
-            <a:schemeClr val="accent2"/>
+          <a:fillRef idx="1">
+            <a:schemeClr val="accent5"/>
           </a:fillRef>
-          <a:effectRef idx="1">
-            <a:schemeClr val="accent2"/>
+          <a:effectRef idx="0">
+            <a:schemeClr val="accent5"/>
           </a:effectRef>
           <a:fontRef idx="minor">
-            <a:schemeClr val="dk1"/>
+            <a:schemeClr val="lt1"/>
           </a:fontRef>
         </p:style>
         <p:txBody>
@@ -4039,28 +4009,22 @@
           <a:prstGeom prst="roundRect">
             <a:avLst/>
           </a:prstGeom>
-          <a:solidFill>
-            <a:schemeClr val="accent3"/>
-          </a:solidFill>
-          <a:ln w="19050">
-            <a:solidFill>
-              <a:schemeClr val="bg1"/>
-            </a:solidFill>
-          </a:ln>
-          <a:effectLst/>
+          <a:ln/>
         </p:spPr>
         <p:style>
-          <a:lnRef idx="1">
-            <a:schemeClr val="accent2"/>
+          <a:lnRef idx="2">
+            <a:schemeClr val="accent5">
+              <a:shade val="50000"/>
+            </a:schemeClr>
           </a:lnRef>
-          <a:fillRef idx="2">
-            <a:schemeClr val="accent2"/>
+          <a:fillRef idx="1">
+            <a:schemeClr val="accent5"/>
           </a:fillRef>
-          <a:effectRef idx="1">
-            <a:schemeClr val="accent2"/>
+          <a:effectRef idx="0">
+            <a:schemeClr val="accent5"/>
           </a:effectRef>
           <a:fontRef idx="minor">
-            <a:schemeClr val="dk1"/>
+            <a:schemeClr val="lt1"/>
           </a:fontRef>
         </p:style>
         <p:txBody>
@@ -4098,28 +4062,22 @@
           <a:prstGeom prst="roundRect">
             <a:avLst/>
           </a:prstGeom>
-          <a:solidFill>
-            <a:schemeClr val="accent3"/>
-          </a:solidFill>
-          <a:ln w="19050">
-            <a:solidFill>
-              <a:schemeClr val="bg1"/>
-            </a:solidFill>
-          </a:ln>
-          <a:effectLst/>
+          <a:ln/>
         </p:spPr>
         <p:style>
-          <a:lnRef idx="1">
-            <a:schemeClr val="accent2"/>
+          <a:lnRef idx="2">
+            <a:schemeClr val="accent5">
+              <a:shade val="50000"/>
+            </a:schemeClr>
           </a:lnRef>
-          <a:fillRef idx="2">
-            <a:schemeClr val="accent2"/>
+          <a:fillRef idx="1">
+            <a:schemeClr val="accent5"/>
           </a:fillRef>
-          <a:effectRef idx="1">
-            <a:schemeClr val="accent2"/>
+          <a:effectRef idx="0">
+            <a:schemeClr val="accent5"/>
           </a:effectRef>
           <a:fontRef idx="minor">
-            <a:schemeClr val="dk1"/>
+            <a:schemeClr val="lt1"/>
           </a:fontRef>
         </p:style>
         <p:txBody>
@@ -4151,34 +4109,28 @@
         </p:nvSpPr>
         <p:spPr>
           <a:xfrm flipH="1">
-            <a:off x="5080908" y="4573063"/>
+            <a:off x="5303774" y="4560849"/>
             <a:ext cx="820138" cy="330940"/>
           </a:xfrm>
           <a:prstGeom prst="roundRect">
             <a:avLst/>
           </a:prstGeom>
-          <a:solidFill>
-            <a:schemeClr val="accent3"/>
-          </a:solidFill>
-          <a:ln w="19050">
-            <a:solidFill>
-              <a:schemeClr val="bg1"/>
-            </a:solidFill>
-          </a:ln>
-          <a:effectLst/>
+          <a:ln/>
         </p:spPr>
         <p:style>
-          <a:lnRef idx="1">
-            <a:schemeClr val="accent2"/>
+          <a:lnRef idx="2">
+            <a:schemeClr val="accent5">
+              <a:shade val="50000"/>
+            </a:schemeClr>
           </a:lnRef>
-          <a:fillRef idx="2">
-            <a:schemeClr val="accent2"/>
+          <a:fillRef idx="1">
+            <a:schemeClr val="accent5"/>
           </a:fillRef>
-          <a:effectRef idx="1">
-            <a:schemeClr val="accent2"/>
+          <a:effectRef idx="0">
+            <a:schemeClr val="accent5"/>
           </a:effectRef>
           <a:fontRef idx="minor">
-            <a:schemeClr val="dk1"/>
+            <a:schemeClr val="lt1"/>
           </a:fontRef>
         </p:style>
         <p:txBody>
@@ -4216,28 +4168,22 @@
           <a:prstGeom prst="roundRect">
             <a:avLst/>
           </a:prstGeom>
-          <a:solidFill>
-            <a:schemeClr val="accent3"/>
-          </a:solidFill>
-          <a:ln w="19050">
-            <a:solidFill>
-              <a:schemeClr val="bg1"/>
-            </a:solidFill>
-          </a:ln>
-          <a:effectLst/>
+          <a:ln/>
         </p:spPr>
         <p:style>
-          <a:lnRef idx="1">
-            <a:schemeClr val="accent2"/>
+          <a:lnRef idx="2">
+            <a:schemeClr val="accent5">
+              <a:shade val="50000"/>
+            </a:schemeClr>
           </a:lnRef>
-          <a:fillRef idx="2">
-            <a:schemeClr val="accent2"/>
+          <a:fillRef idx="1">
+            <a:schemeClr val="accent5"/>
           </a:fillRef>
-          <a:effectRef idx="1">
-            <a:schemeClr val="accent2"/>
+          <a:effectRef idx="0">
+            <a:schemeClr val="accent5"/>
           </a:effectRef>
           <a:fontRef idx="minor">
-            <a:schemeClr val="dk1"/>
+            <a:schemeClr val="lt1"/>
           </a:fontRef>
         </p:style>
         <p:txBody>
@@ -4275,28 +4221,22 @@
           <a:prstGeom prst="roundRect">
             <a:avLst/>
           </a:prstGeom>
-          <a:solidFill>
-            <a:schemeClr val="accent3"/>
-          </a:solidFill>
-          <a:ln w="19050">
-            <a:solidFill>
-              <a:schemeClr val="bg1"/>
-            </a:solidFill>
-          </a:ln>
-          <a:effectLst/>
+          <a:ln/>
         </p:spPr>
         <p:style>
-          <a:lnRef idx="1">
-            <a:schemeClr val="accent2"/>
+          <a:lnRef idx="2">
+            <a:schemeClr val="accent5">
+              <a:shade val="50000"/>
+            </a:schemeClr>
           </a:lnRef>
-          <a:fillRef idx="2">
-            <a:schemeClr val="accent2"/>
+          <a:fillRef idx="1">
+            <a:schemeClr val="accent5"/>
           </a:fillRef>
-          <a:effectRef idx="1">
-            <a:schemeClr val="accent2"/>
+          <a:effectRef idx="0">
+            <a:schemeClr val="accent5"/>
           </a:effectRef>
           <a:fontRef idx="minor">
-            <a:schemeClr val="dk1"/>
+            <a:schemeClr val="lt1"/>
           </a:fontRef>
         </p:style>
         <p:txBody>
@@ -4334,28 +4274,22 @@
           <a:prstGeom prst="roundRect">
             <a:avLst/>
           </a:prstGeom>
-          <a:solidFill>
-            <a:schemeClr val="accent3"/>
-          </a:solidFill>
-          <a:ln w="19050">
-            <a:solidFill>
-              <a:schemeClr val="bg1"/>
-            </a:solidFill>
-          </a:ln>
-          <a:effectLst/>
+          <a:ln/>
         </p:spPr>
         <p:style>
-          <a:lnRef idx="1">
-            <a:schemeClr val="accent2"/>
+          <a:lnRef idx="2">
+            <a:schemeClr val="accent5">
+              <a:shade val="50000"/>
+            </a:schemeClr>
           </a:lnRef>
-          <a:fillRef idx="2">
-            <a:schemeClr val="accent2"/>
+          <a:fillRef idx="1">
+            <a:schemeClr val="accent5"/>
           </a:fillRef>
-          <a:effectRef idx="1">
-            <a:schemeClr val="accent2"/>
+          <a:effectRef idx="0">
+            <a:schemeClr val="accent5"/>
           </a:effectRef>
           <a:fontRef idx="minor">
-            <a:schemeClr val="dk1"/>
+            <a:schemeClr val="lt1"/>
           </a:fontRef>
         </p:style>
         <p:txBody>
@@ -4393,28 +4327,22 @@
           <a:prstGeom prst="roundRect">
             <a:avLst/>
           </a:prstGeom>
-          <a:solidFill>
-            <a:schemeClr val="accent3"/>
-          </a:solidFill>
-          <a:ln w="19050">
-            <a:solidFill>
-              <a:schemeClr val="bg1"/>
-            </a:solidFill>
-          </a:ln>
-          <a:effectLst/>
+          <a:ln/>
         </p:spPr>
         <p:style>
-          <a:lnRef idx="1">
-            <a:schemeClr val="accent2"/>
+          <a:lnRef idx="2">
+            <a:schemeClr val="accent5">
+              <a:shade val="50000"/>
+            </a:schemeClr>
           </a:lnRef>
-          <a:fillRef idx="2">
-            <a:schemeClr val="accent2"/>
+          <a:fillRef idx="1">
+            <a:schemeClr val="accent5"/>
           </a:fillRef>
-          <a:effectRef idx="1">
-            <a:schemeClr val="accent2"/>
+          <a:effectRef idx="0">
+            <a:schemeClr val="accent5"/>
           </a:effectRef>
           <a:fontRef idx="minor">
-            <a:schemeClr val="dk1"/>
+            <a:schemeClr val="lt1"/>
           </a:fontRef>
         </p:style>
         <p:txBody>
@@ -5047,7 +4975,7 @@
         </p:nvSpPr>
         <p:spPr>
           <a:xfrm>
-            <a:off x="5303774" y="3327359"/>
+            <a:off x="5519410" y="3371214"/>
             <a:ext cx="372569" cy="428046"/>
           </a:xfrm>
           <a:prstGeom prst="diamond">
@@ -5145,8 +5073,8 @@
         </p:nvCxnSpPr>
         <p:spPr>
           <a:xfrm rot="10800000" flipV="1">
-            <a:off x="3442058" y="3541382"/>
-            <a:ext cx="1861716" cy="2173618"/>
+            <a:off x="3442058" y="3585236"/>
+            <a:ext cx="2077352" cy="2129763"/>
           </a:xfrm>
           <a:prstGeom prst="bentConnector2">
             <a:avLst/>
@@ -5178,8 +5106,8 @@
         </p:nvCxnSpPr>
         <p:spPr>
           <a:xfrm>
-            <a:off x="5490058" y="2432455"/>
-            <a:ext cx="0" cy="894903"/>
+            <a:off x="5705694" y="2432455"/>
+            <a:ext cx="8149" cy="938759"/>
           </a:xfrm>
           <a:prstGeom prst="straightConnector1">
             <a:avLst/>
@@ -5215,8 +5143,8 @@
         </p:nvCxnSpPr>
         <p:spPr>
           <a:xfrm>
-            <a:off x="5490059" y="3755405"/>
-            <a:ext cx="918" cy="817658"/>
+            <a:off x="5705695" y="3799260"/>
+            <a:ext cx="8148" cy="761589"/>
           </a:xfrm>
           <a:prstGeom prst="straightConnector1">
             <a:avLst/>
@@ -5252,8 +5180,8 @@
         </p:nvCxnSpPr>
         <p:spPr>
           <a:xfrm rot="5400000">
-            <a:off x="4061020" y="4285042"/>
-            <a:ext cx="810997" cy="2048919"/>
+            <a:off x="4166346" y="4167502"/>
+            <a:ext cx="823211" cy="2271785"/>
           </a:xfrm>
           <a:prstGeom prst="bentConnector3">
             <a:avLst>
@@ -5347,14 +5275,59 @@
           <a:p>
             <a:pPr algn="ctr"/>
             <a:r>
-              <a:rPr lang="en-SG" sz="1400" dirty="0" smtClean="0">
+              <a:rPr lang="en-SG" sz="1400" dirty="0" smtClean="0"/>
+              <a:t>(end application)</a:t>
+            </a:r>
+            <a:endParaRPr lang="en-SG" sz="1400" dirty="0"/>
+          </a:p>
+        </p:txBody>
+      </p:sp>
+      <p:sp>
+        <p:nvSpPr>
+          <p:cNvPr id="42" name="Rectangle 62"/>
+          <p:cNvSpPr/>
+          <p:nvPr/>
+        </p:nvSpPr>
+        <p:spPr>
+          <a:xfrm flipH="1">
+            <a:off x="8996476" y="2088446"/>
+            <a:ext cx="633794" cy="330940"/>
+          </a:xfrm>
+          <a:prstGeom prst="roundRect">
+            <a:avLst/>
+          </a:prstGeom>
+          <a:ln/>
+        </p:spPr>
+        <p:style>
+          <a:lnRef idx="2">
+            <a:schemeClr val="accent5">
+              <a:shade val="50000"/>
+            </a:schemeClr>
+          </a:lnRef>
+          <a:fillRef idx="1">
+            <a:schemeClr val="accent5"/>
+          </a:fillRef>
+          <a:effectRef idx="0">
+            <a:schemeClr val="accent5"/>
+          </a:effectRef>
+          <a:fontRef idx="minor">
+            <a:schemeClr val="lt1"/>
+          </a:fontRef>
+        </p:style>
+        <p:txBody>
+          <a:bodyPr rtlCol="0" anchor="ctr"/>
+          <a:lstStyle/>
+          <a:p>
+            <a:pPr algn="ctr"/>
+            <a:r>
+              <a:rPr lang="en-US" sz="1600" dirty="0" smtClean="0">
                 <a:solidFill>
                   <a:schemeClr val="bg1"/>
                 </a:solidFill>
               </a:rPr>
-              <a:t>(end application)</a:t>
-            </a:r>
-            <a:endParaRPr lang="en-SG" sz="1400" dirty="0">
+              <a:t>View</a:t>
+            </a:r>
+            <a:endParaRPr lang="en-SG" sz="1600" dirty="0">
               <a:solidFill>
                 <a:schemeClr val="bg1"/>
               </a:solidFill>
@@ -5362,6 +5335,333 @@
           </a:p>
         </p:txBody>
       </p:sp>
+      <p:sp>
+        <p:nvSpPr>
+          <p:cNvPr id="43" name="Rectangle 62"/>
+          <p:cNvSpPr/>
+          <p:nvPr/>
+        </p:nvSpPr>
+        <p:spPr>
+          <a:xfrm flipH="1">
+            <a:off x="8158820" y="2088446"/>
+            <a:ext cx="633794" cy="330940"/>
+          </a:xfrm>
+          <a:prstGeom prst="roundRect">
+            <a:avLst/>
+          </a:prstGeom>
+          <a:ln/>
+        </p:spPr>
+        <p:style>
+          <a:lnRef idx="2">
+            <a:schemeClr val="accent5">
+              <a:shade val="50000"/>
+            </a:schemeClr>
+          </a:lnRef>
+          <a:fillRef idx="1">
+            <a:schemeClr val="accent5"/>
+          </a:fillRef>
+          <a:effectRef idx="0">
+            <a:schemeClr val="accent5"/>
+          </a:effectRef>
+          <a:fontRef idx="minor">
+            <a:schemeClr val="lt1"/>
+          </a:fontRef>
+        </p:style>
+        <p:txBody>
+          <a:bodyPr rtlCol="0" anchor="ctr"/>
+          <a:lstStyle/>
+          <a:p>
+            <a:pPr algn="ctr"/>
+            <a:r>
+              <a:rPr lang="en-US" sz="1600" dirty="0" smtClean="0">
+                <a:solidFill>
+                  <a:schemeClr val="bg1"/>
+                </a:solidFill>
+              </a:rPr>
+              <a:t>Find</a:t>
+            </a:r>
+            <a:endParaRPr lang="en-SG" sz="1600" dirty="0">
+              <a:solidFill>
+                <a:schemeClr val="bg1"/>
+              </a:solidFill>
+            </a:endParaRPr>
+          </a:p>
+        </p:txBody>
+      </p:sp>
+      <p:sp>
+        <p:nvSpPr>
+          <p:cNvPr id="44" name="Rectangle 62"/>
+          <p:cNvSpPr/>
+          <p:nvPr/>
+        </p:nvSpPr>
+        <p:spPr>
+          <a:xfrm flipH="1">
+            <a:off x="9918237" y="2088446"/>
+            <a:ext cx="587208" cy="330940"/>
+          </a:xfrm>
+          <a:prstGeom prst="roundRect">
+            <a:avLst/>
+          </a:prstGeom>
+          <a:ln/>
+        </p:spPr>
+        <p:style>
+          <a:lnRef idx="2">
+            <a:schemeClr val="accent5">
+              <a:shade val="50000"/>
+            </a:schemeClr>
+          </a:lnRef>
+          <a:fillRef idx="1">
+            <a:schemeClr val="accent5"/>
+          </a:fillRef>
+          <a:effectRef idx="0">
+            <a:schemeClr val="accent5"/>
+          </a:effectRef>
+          <a:fontRef idx="minor">
+            <a:schemeClr val="lt1"/>
+          </a:fontRef>
+        </p:style>
+        <p:txBody>
+          <a:bodyPr rtlCol="0" anchor="ctr"/>
+          <a:lstStyle/>
+          <a:p>
+            <a:r>
+              <a:rPr lang="en-US" sz="1600" dirty="0" smtClean="0">
+                <a:solidFill>
+                  <a:schemeClr val="bg1"/>
+                </a:solidFill>
+              </a:rPr>
+              <a:t>List</a:t>
+            </a:r>
+            <a:endParaRPr lang="en-SG" sz="1600" dirty="0">
+              <a:solidFill>
+                <a:schemeClr val="bg1"/>
+              </a:solidFill>
+            </a:endParaRPr>
+          </a:p>
+        </p:txBody>
+      </p:sp>
+      <p:cxnSp>
+        <p:nvCxnSpPr>
+          <p:cNvPr id="45" name="Straight Arrow Connector 44"/>
+          <p:cNvCxnSpPr/>
+          <p:nvPr/>
+        </p:nvCxnSpPr>
+        <p:spPr>
+          <a:xfrm>
+            <a:off x="2623773" y="1308314"/>
+            <a:ext cx="6619287" cy="787634"/>
+          </a:xfrm>
+          <a:prstGeom prst="straightConnector1">
+            <a:avLst/>
+          </a:prstGeom>
+          <a:ln w="28575">
+            <a:solidFill>
+              <a:schemeClr val="tx2">
+                <a:lumMod val="60000"/>
+                <a:lumOff val="40000"/>
+              </a:schemeClr>
+            </a:solidFill>
+            <a:tailEnd type="arrow"/>
+          </a:ln>
+        </p:spPr>
+        <p:style>
+          <a:lnRef idx="1">
+            <a:schemeClr val="accent1"/>
+          </a:lnRef>
+          <a:fillRef idx="0">
+            <a:schemeClr val="accent1"/>
+          </a:fillRef>
+          <a:effectRef idx="0">
+            <a:schemeClr val="accent1"/>
+          </a:effectRef>
+          <a:fontRef idx="minor">
+            <a:schemeClr val="tx1"/>
+          </a:fontRef>
+        </p:style>
+      </p:cxnSp>
+      <p:cxnSp>
+        <p:nvCxnSpPr>
+          <p:cNvPr id="60" name="Straight Arrow Connector 59"/>
+          <p:cNvCxnSpPr/>
+          <p:nvPr/>
+        </p:nvCxnSpPr>
+        <p:spPr>
+          <a:xfrm>
+            <a:off x="2541523" y="1316525"/>
+            <a:ext cx="5897070" cy="768746"/>
+          </a:xfrm>
+          <a:prstGeom prst="straightConnector1">
+            <a:avLst/>
+          </a:prstGeom>
+          <a:ln w="28575">
+            <a:solidFill>
+              <a:schemeClr val="tx2">
+                <a:lumMod val="60000"/>
+                <a:lumOff val="40000"/>
+              </a:schemeClr>
+            </a:solidFill>
+            <a:tailEnd type="arrow"/>
+          </a:ln>
+        </p:spPr>
+        <p:style>
+          <a:lnRef idx="1">
+            <a:schemeClr val="accent1"/>
+          </a:lnRef>
+          <a:fillRef idx="0">
+            <a:schemeClr val="accent1"/>
+          </a:fillRef>
+          <a:effectRef idx="0">
+            <a:schemeClr val="accent1"/>
+          </a:effectRef>
+          <a:fontRef idx="minor">
+            <a:schemeClr val="tx1"/>
+          </a:fontRef>
+        </p:style>
+      </p:cxnSp>
+      <p:cxnSp>
+        <p:nvCxnSpPr>
+          <p:cNvPr id="61" name="Straight Arrow Connector 60"/>
+          <p:cNvCxnSpPr/>
+          <p:nvPr/>
+        </p:nvCxnSpPr>
+        <p:spPr>
+          <a:xfrm>
+            <a:off x="2601669" y="1283299"/>
+            <a:ext cx="7549904" cy="785870"/>
+          </a:xfrm>
+          <a:prstGeom prst="straightConnector1">
+            <a:avLst/>
+          </a:prstGeom>
+          <a:ln w="28575">
+            <a:solidFill>
+              <a:schemeClr val="tx2">
+                <a:lumMod val="60000"/>
+                <a:lumOff val="40000"/>
+              </a:schemeClr>
+            </a:solidFill>
+            <a:tailEnd type="arrow"/>
+          </a:ln>
+        </p:spPr>
+        <p:style>
+          <a:lnRef idx="1">
+            <a:schemeClr val="accent1"/>
+          </a:lnRef>
+          <a:fillRef idx="0">
+            <a:schemeClr val="accent1"/>
+          </a:fillRef>
+          <a:effectRef idx="0">
+            <a:schemeClr val="accent1"/>
+          </a:effectRef>
+          <a:fontRef idx="minor">
+            <a:schemeClr val="tx1"/>
+          </a:fontRef>
+        </p:style>
+      </p:cxnSp>
+      <p:cxnSp>
+        <p:nvCxnSpPr>
+          <p:cNvPr id="62" name="Elbow Connector 61"/>
+          <p:cNvCxnSpPr>
+            <a:stCxn id="43" idx="2"/>
+          </p:cNvCxnSpPr>
+          <p:nvPr/>
+        </p:nvCxnSpPr>
+        <p:spPr>
+          <a:xfrm rot="5400000">
+            <a:off x="5007454" y="2399137"/>
+            <a:ext cx="3448015" cy="3488512"/>
+          </a:xfrm>
+          <a:prstGeom prst="bentConnector2">
+            <a:avLst/>
+          </a:prstGeom>
+          <a:ln>
+            <a:tailEnd type="triangle"/>
+          </a:ln>
+        </p:spPr>
+        <p:style>
+          <a:lnRef idx="2">
+            <a:schemeClr val="accent1"/>
+          </a:lnRef>
+          <a:fillRef idx="0">
+            <a:schemeClr val="accent1"/>
+          </a:fillRef>
+          <a:effectRef idx="1">
+            <a:schemeClr val="accent1"/>
+          </a:effectRef>
+          <a:fontRef idx="minor">
+            <a:schemeClr val="tx1"/>
+          </a:fontRef>
+        </p:style>
+      </p:cxnSp>
+      <p:cxnSp>
+        <p:nvCxnSpPr>
+          <p:cNvPr id="67" name="Elbow Connector 66"/>
+          <p:cNvCxnSpPr/>
+          <p:nvPr/>
+        </p:nvCxnSpPr>
+        <p:spPr>
+          <a:xfrm rot="10800000" flipV="1">
+            <a:off x="4987205" y="2422560"/>
+            <a:ext cx="4337777" cy="3477363"/>
+          </a:xfrm>
+          <a:prstGeom prst="bentConnector3">
+            <a:avLst>
+              <a:gd name="adj1" fmla="val -441"/>
+            </a:avLst>
+          </a:prstGeom>
+          <a:ln>
+            <a:tailEnd type="triangle"/>
+          </a:ln>
+        </p:spPr>
+        <p:style>
+          <a:lnRef idx="2">
+            <a:schemeClr val="accent1"/>
+          </a:lnRef>
+          <a:fillRef idx="0">
+            <a:schemeClr val="accent1"/>
+          </a:fillRef>
+          <a:effectRef idx="1">
+            <a:schemeClr val="accent1"/>
+          </a:effectRef>
+          <a:fontRef idx="minor">
+            <a:schemeClr val="tx1"/>
+          </a:fontRef>
+        </p:style>
+      </p:cxnSp>
+      <p:cxnSp>
+        <p:nvCxnSpPr>
+          <p:cNvPr id="70" name="Elbow Connector 69"/>
+          <p:cNvCxnSpPr/>
+          <p:nvPr/>
+        </p:nvCxnSpPr>
+        <p:spPr>
+          <a:xfrm rot="10800000" flipV="1">
+            <a:off x="5013863" y="2418603"/>
+            <a:ext cx="5227744" cy="3481320"/>
+          </a:xfrm>
+          <a:prstGeom prst="bentConnector3">
+            <a:avLst>
+              <a:gd name="adj1" fmla="val 181"/>
+            </a:avLst>
+          </a:prstGeom>
+          <a:ln>
+            <a:tailEnd type="triangle"/>
+          </a:ln>
+        </p:spPr>
+        <p:style>
+          <a:lnRef idx="2">
+            <a:schemeClr val="accent1"/>
+          </a:lnRef>
+          <a:fillRef idx="0">
+            <a:schemeClr val="accent1"/>
+          </a:fillRef>
+          <a:effectRef idx="1">
+            <a:schemeClr val="accent1"/>
+          </a:effectRef>
+          <a:fontRef idx="minor">
+            <a:schemeClr val="tx1"/>
+          </a:fontRef>
+        </p:style>
+      </p:cxnSp>
     </p:spTree>
     <p:extLst>
       <p:ext uri="{BB962C8B-B14F-4D97-AF65-F5344CB8AC3E}">

</xml_diff>